<commit_message>
update template in sample_Data folder
</commit_message>
<xml_diff>
--- a/org.mwc.cmap.combined.feature/root_installs/sample_data/other_formats/master_template.pptx
+++ b/org.mwc.cmap.combined.feature/root_installs/sample_data/other_formats/master_template.pptx
@@ -109,7 +109,18 @@
   </p:defaultTextStyle>
   <p:extLst>
     <p:ext uri="{EFAFB233-063F-42B5-8137-9DF3F51BA10A}">
-      <p15:sldGuideLst xmlns:p15="http://schemas.microsoft.com/office/powerpoint/2012/main" xmlns=""/>
+      <p15:sldGuideLst xmlns:p15="http://schemas.microsoft.com/office/powerpoint/2012/main">
+        <p15:guide id="1" orient="horz" pos="2160">
+          <p15:clr>
+            <a:srgbClr val="A4A3A4"/>
+          </p15:clr>
+        </p15:guide>
+        <p15:guide id="2" pos="3840">
+          <p15:clr>
+            <a:srgbClr val="A4A3A4"/>
+          </p15:clr>
+        </p15:guide>
+      </p15:sldGuideLst>
     </p:ext>
   </p:extLst>
 </p:presentation>
@@ -197,7 +208,7 @@
           <a:p>
             <a:fld id="{5DBDFAF8-9CD3-4716-8CF2-6121A8FDDE9B}" type="datetimeFigureOut">
               <a:rPr lang="en-US" smtClean="0"/>
-              <a:t>16/07/18</a:t>
+              <a:t>9/27/2018</a:t>
             </a:fld>
             <a:endParaRPr lang="en-US"/>
           </a:p>
@@ -261,38 +272,37 @@
           <a:p>
             <a:pPr lvl="0"/>
             <a:r>
-              <a:rPr lang="en-US" smtClean="0"/>
+              <a:rPr lang="en-US"/>
               <a:t>Edit Master text styles</a:t>
             </a:r>
           </a:p>
           <a:p>
             <a:pPr lvl="1"/>
             <a:r>
-              <a:rPr lang="en-US" smtClean="0"/>
+              <a:rPr lang="en-US"/>
               <a:t>Second level</a:t>
             </a:r>
           </a:p>
           <a:p>
             <a:pPr lvl="2"/>
             <a:r>
-              <a:rPr lang="en-US" smtClean="0"/>
+              <a:rPr lang="en-US"/>
               <a:t>Third level</a:t>
             </a:r>
           </a:p>
           <a:p>
             <a:pPr lvl="3"/>
             <a:r>
-              <a:rPr lang="en-US" smtClean="0"/>
+              <a:rPr lang="en-US"/>
               <a:t>Fourth level</a:t>
             </a:r>
           </a:p>
           <a:p>
             <a:pPr lvl="4"/>
             <a:r>
-              <a:rPr lang="en-US" smtClean="0"/>
+              <a:rPr lang="en-US"/>
               <a:t>Fifth level</a:t>
             </a:r>
-            <a:endParaRPr lang="en-US"/>
           </a:p>
         </p:txBody>
       </p:sp>
@@ -527,7 +537,7 @@
               <a:defRPr/>
             </a:pPr>
             <a:r>
-              <a:rPr lang="en-US" dirty="0" smtClean="0"/>
+              <a:rPr lang="en-US" dirty="0"/>
               <a:t>Americas Cup 2018. Race 2a</a:t>
             </a:r>
           </a:p>
@@ -610,7 +620,7 @@
           <a:lstStyle/>
           <a:p>
             <a:r>
-              <a:rPr lang="en-GB" smtClean="0"/>
+              <a:rPr lang="en-GB"/>
               <a:t>Click to edit Master title style</a:t>
             </a:r>
             <a:endParaRPr lang="en-US"/>
@@ -729,7 +739,7 @@
           </a:lstStyle>
           <a:p>
             <a:r>
-              <a:rPr lang="en-GB" smtClean="0"/>
+              <a:rPr lang="en-GB"/>
               <a:t>Click to edit Master subtitle style</a:t>
             </a:r>
             <a:endParaRPr lang="en-US"/>
@@ -753,7 +763,7 @@
           <a:p>
             <a:fld id="{07AF7C9C-3FFC-F543-8CD5-56B058077314}" type="datetimeFigureOut">
               <a:rPr lang="en-US" smtClean="0"/>
-              <a:t>16/07/18</a:t>
+              <a:t>9/27/2018</a:t>
             </a:fld>
             <a:endParaRPr lang="en-US"/>
           </a:p>
@@ -847,7 +857,7 @@
           <a:lstStyle/>
           <a:p>
             <a:r>
-              <a:rPr lang="en-GB" smtClean="0"/>
+              <a:rPr lang="en-GB"/>
               <a:t>Click to edit Master title style</a:t>
             </a:r>
             <a:endParaRPr lang="en-US"/>
@@ -871,35 +881,35 @@
           <a:p>
             <a:pPr lvl="0"/>
             <a:r>
-              <a:rPr lang="en-GB" smtClean="0"/>
+              <a:rPr lang="en-GB"/>
               <a:t>Click to edit Master text styles</a:t>
             </a:r>
           </a:p>
           <a:p>
             <a:pPr lvl="1"/>
             <a:r>
-              <a:rPr lang="en-GB" smtClean="0"/>
+              <a:rPr lang="en-GB"/>
               <a:t>Second level</a:t>
             </a:r>
           </a:p>
           <a:p>
             <a:pPr lvl="2"/>
             <a:r>
-              <a:rPr lang="en-GB" smtClean="0"/>
+              <a:rPr lang="en-GB"/>
               <a:t>Third level</a:t>
             </a:r>
           </a:p>
           <a:p>
             <a:pPr lvl="3"/>
             <a:r>
-              <a:rPr lang="en-GB" smtClean="0"/>
+              <a:rPr lang="en-GB"/>
               <a:t>Fourth level</a:t>
             </a:r>
           </a:p>
           <a:p>
             <a:pPr lvl="4"/>
             <a:r>
-              <a:rPr lang="en-GB" smtClean="0"/>
+              <a:rPr lang="en-GB"/>
               <a:t>Fifth level</a:t>
             </a:r>
             <a:endParaRPr lang="en-US"/>
@@ -923,7 +933,7 @@
           <a:p>
             <a:fld id="{07AF7C9C-3FFC-F543-8CD5-56B058077314}" type="datetimeFigureOut">
               <a:rPr lang="en-US" smtClean="0"/>
-              <a:t>16/07/18</a:t>
+              <a:t>9/27/2018</a:t>
             </a:fld>
             <a:endParaRPr lang="en-US"/>
           </a:p>
@@ -1022,7 +1032,7 @@
           <a:lstStyle/>
           <a:p>
             <a:r>
-              <a:rPr lang="en-GB" smtClean="0"/>
+              <a:rPr lang="en-GB"/>
               <a:t>Click to edit Master title style</a:t>
             </a:r>
             <a:endParaRPr lang="en-US"/>
@@ -1051,35 +1061,35 @@
           <a:p>
             <a:pPr lvl="0"/>
             <a:r>
-              <a:rPr lang="en-GB" smtClean="0"/>
+              <a:rPr lang="en-GB"/>
               <a:t>Click to edit Master text styles</a:t>
             </a:r>
           </a:p>
           <a:p>
             <a:pPr lvl="1"/>
             <a:r>
-              <a:rPr lang="en-GB" smtClean="0"/>
+              <a:rPr lang="en-GB"/>
               <a:t>Second level</a:t>
             </a:r>
           </a:p>
           <a:p>
             <a:pPr lvl="2"/>
             <a:r>
-              <a:rPr lang="en-GB" smtClean="0"/>
+              <a:rPr lang="en-GB"/>
               <a:t>Third level</a:t>
             </a:r>
           </a:p>
           <a:p>
             <a:pPr lvl="3"/>
             <a:r>
-              <a:rPr lang="en-GB" smtClean="0"/>
+              <a:rPr lang="en-GB"/>
               <a:t>Fourth level</a:t>
             </a:r>
           </a:p>
           <a:p>
             <a:pPr lvl="4"/>
             <a:r>
-              <a:rPr lang="en-GB" smtClean="0"/>
+              <a:rPr lang="en-GB"/>
               <a:t>Fifth level</a:t>
             </a:r>
             <a:endParaRPr lang="en-US"/>
@@ -1103,7 +1113,7 @@
           <a:p>
             <a:fld id="{07AF7C9C-3FFC-F543-8CD5-56B058077314}" type="datetimeFigureOut">
               <a:rPr lang="en-US" smtClean="0"/>
-              <a:t>16/07/18</a:t>
+              <a:t>9/27/2018</a:t>
             </a:fld>
             <a:endParaRPr lang="en-US"/>
           </a:p>
@@ -1197,7 +1207,7 @@
           <a:lstStyle/>
           <a:p>
             <a:r>
-              <a:rPr lang="en-GB" smtClean="0"/>
+              <a:rPr lang="en-GB"/>
               <a:t>Click to edit Master title style</a:t>
             </a:r>
             <a:endParaRPr lang="en-US"/>
@@ -1221,35 +1231,35 @@
           <a:p>
             <a:pPr lvl="0"/>
             <a:r>
-              <a:rPr lang="en-GB" smtClean="0"/>
+              <a:rPr lang="en-GB"/>
               <a:t>Click to edit Master text styles</a:t>
             </a:r>
           </a:p>
           <a:p>
             <a:pPr lvl="1"/>
             <a:r>
-              <a:rPr lang="en-GB" smtClean="0"/>
+              <a:rPr lang="en-GB"/>
               <a:t>Second level</a:t>
             </a:r>
           </a:p>
           <a:p>
             <a:pPr lvl="2"/>
             <a:r>
-              <a:rPr lang="en-GB" smtClean="0"/>
+              <a:rPr lang="en-GB"/>
               <a:t>Third level</a:t>
             </a:r>
           </a:p>
           <a:p>
             <a:pPr lvl="3"/>
             <a:r>
-              <a:rPr lang="en-GB" smtClean="0"/>
+              <a:rPr lang="en-GB"/>
               <a:t>Fourth level</a:t>
             </a:r>
           </a:p>
           <a:p>
             <a:pPr lvl="4"/>
             <a:r>
-              <a:rPr lang="en-GB" smtClean="0"/>
+              <a:rPr lang="en-GB"/>
               <a:t>Fifth level</a:t>
             </a:r>
             <a:endParaRPr lang="en-US"/>
@@ -1273,7 +1283,7 @@
           <a:p>
             <a:fld id="{07AF7C9C-3FFC-F543-8CD5-56B058077314}" type="datetimeFigureOut">
               <a:rPr lang="en-US" smtClean="0"/>
-              <a:t>16/07/18</a:t>
+              <a:t>9/27/2018</a:t>
             </a:fld>
             <a:endParaRPr lang="en-US"/>
           </a:p>
@@ -1376,7 +1386,7 @@
           </a:lstStyle>
           <a:p>
             <a:r>
-              <a:rPr lang="en-GB" smtClean="0"/>
+              <a:rPr lang="en-GB"/>
               <a:t>Click to edit Master title style</a:t>
             </a:r>
             <a:endParaRPr lang="en-US"/>
@@ -1496,7 +1506,7 @@
           <a:p>
             <a:pPr lvl="0"/>
             <a:r>
-              <a:rPr lang="en-GB" smtClean="0"/>
+              <a:rPr lang="en-GB"/>
               <a:t>Click to edit Master text styles</a:t>
             </a:r>
           </a:p>
@@ -1519,7 +1529,7 @@
           <a:p>
             <a:fld id="{07AF7C9C-3FFC-F543-8CD5-56B058077314}" type="datetimeFigureOut">
               <a:rPr lang="en-US" smtClean="0"/>
-              <a:t>16/07/18</a:t>
+              <a:t>9/27/2018</a:t>
             </a:fld>
             <a:endParaRPr lang="en-US"/>
           </a:p>
@@ -1613,7 +1623,7 @@
           <a:lstStyle/>
           <a:p>
             <a:r>
-              <a:rPr lang="en-GB" smtClean="0"/>
+              <a:rPr lang="en-GB"/>
               <a:t>Click to edit Master title style</a:t>
             </a:r>
             <a:endParaRPr lang="en-US"/>
@@ -1670,35 +1680,35 @@
           <a:p>
             <a:pPr lvl="0"/>
             <a:r>
-              <a:rPr lang="en-GB" smtClean="0"/>
+              <a:rPr lang="en-GB"/>
               <a:t>Click to edit Master text styles</a:t>
             </a:r>
           </a:p>
           <a:p>
             <a:pPr lvl="1"/>
             <a:r>
-              <a:rPr lang="en-GB" smtClean="0"/>
+              <a:rPr lang="en-GB"/>
               <a:t>Second level</a:t>
             </a:r>
           </a:p>
           <a:p>
             <a:pPr lvl="2"/>
             <a:r>
-              <a:rPr lang="en-GB" smtClean="0"/>
+              <a:rPr lang="en-GB"/>
               <a:t>Third level</a:t>
             </a:r>
           </a:p>
           <a:p>
             <a:pPr lvl="3"/>
             <a:r>
-              <a:rPr lang="en-GB" smtClean="0"/>
+              <a:rPr lang="en-GB"/>
               <a:t>Fourth level</a:t>
             </a:r>
           </a:p>
           <a:p>
             <a:pPr lvl="4"/>
             <a:r>
-              <a:rPr lang="en-GB" smtClean="0"/>
+              <a:rPr lang="en-GB"/>
               <a:t>Fifth level</a:t>
             </a:r>
             <a:endParaRPr lang="en-US"/>
@@ -1755,35 +1765,35 @@
           <a:p>
             <a:pPr lvl="0"/>
             <a:r>
-              <a:rPr lang="en-GB" smtClean="0"/>
+              <a:rPr lang="en-GB"/>
               <a:t>Click to edit Master text styles</a:t>
             </a:r>
           </a:p>
           <a:p>
             <a:pPr lvl="1"/>
             <a:r>
-              <a:rPr lang="en-GB" smtClean="0"/>
+              <a:rPr lang="en-GB"/>
               <a:t>Second level</a:t>
             </a:r>
           </a:p>
           <a:p>
             <a:pPr lvl="2"/>
             <a:r>
-              <a:rPr lang="en-GB" smtClean="0"/>
+              <a:rPr lang="en-GB"/>
               <a:t>Third level</a:t>
             </a:r>
           </a:p>
           <a:p>
             <a:pPr lvl="3"/>
             <a:r>
-              <a:rPr lang="en-GB" smtClean="0"/>
+              <a:rPr lang="en-GB"/>
               <a:t>Fourth level</a:t>
             </a:r>
           </a:p>
           <a:p>
             <a:pPr lvl="4"/>
             <a:r>
-              <a:rPr lang="en-GB" smtClean="0"/>
+              <a:rPr lang="en-GB"/>
               <a:t>Fifth level</a:t>
             </a:r>
             <a:endParaRPr lang="en-US"/>
@@ -1807,7 +1817,7 @@
           <a:p>
             <a:fld id="{07AF7C9C-3FFC-F543-8CD5-56B058077314}" type="datetimeFigureOut">
               <a:rPr lang="en-US" smtClean="0"/>
-              <a:t>16/07/18</a:t>
+              <a:t>9/27/2018</a:t>
             </a:fld>
             <a:endParaRPr lang="en-US"/>
           </a:p>
@@ -1905,7 +1915,7 @@
           </a:lstStyle>
           <a:p>
             <a:r>
-              <a:rPr lang="en-GB" smtClean="0"/>
+              <a:rPr lang="en-GB"/>
               <a:t>Click to edit Master title style</a:t>
             </a:r>
             <a:endParaRPr lang="en-US"/>
@@ -1971,7 +1981,7 @@
           <a:p>
             <a:pPr lvl="0"/>
             <a:r>
-              <a:rPr lang="en-GB" smtClean="0"/>
+              <a:rPr lang="en-GB"/>
               <a:t>Click to edit Master text styles</a:t>
             </a:r>
           </a:p>
@@ -2027,35 +2037,35 @@
           <a:p>
             <a:pPr lvl="0"/>
             <a:r>
-              <a:rPr lang="en-GB" smtClean="0"/>
+              <a:rPr lang="en-GB"/>
               <a:t>Click to edit Master text styles</a:t>
             </a:r>
           </a:p>
           <a:p>
             <a:pPr lvl="1"/>
             <a:r>
-              <a:rPr lang="en-GB" smtClean="0"/>
+              <a:rPr lang="en-GB"/>
               <a:t>Second level</a:t>
             </a:r>
           </a:p>
           <a:p>
             <a:pPr lvl="2"/>
             <a:r>
-              <a:rPr lang="en-GB" smtClean="0"/>
+              <a:rPr lang="en-GB"/>
               <a:t>Third level</a:t>
             </a:r>
           </a:p>
           <a:p>
             <a:pPr lvl="3"/>
             <a:r>
-              <a:rPr lang="en-GB" smtClean="0"/>
+              <a:rPr lang="en-GB"/>
               <a:t>Fourth level</a:t>
             </a:r>
           </a:p>
           <a:p>
             <a:pPr lvl="4"/>
             <a:r>
-              <a:rPr lang="en-GB" smtClean="0"/>
+              <a:rPr lang="en-GB"/>
               <a:t>Fifth level</a:t>
             </a:r>
             <a:endParaRPr lang="en-US"/>
@@ -2121,7 +2131,7 @@
           <a:p>
             <a:pPr lvl="0"/>
             <a:r>
-              <a:rPr lang="en-GB" smtClean="0"/>
+              <a:rPr lang="en-GB"/>
               <a:t>Click to edit Master text styles</a:t>
             </a:r>
           </a:p>
@@ -2177,35 +2187,35 @@
           <a:p>
             <a:pPr lvl="0"/>
             <a:r>
-              <a:rPr lang="en-GB" smtClean="0"/>
+              <a:rPr lang="en-GB"/>
               <a:t>Click to edit Master text styles</a:t>
             </a:r>
           </a:p>
           <a:p>
             <a:pPr lvl="1"/>
             <a:r>
-              <a:rPr lang="en-GB" smtClean="0"/>
+              <a:rPr lang="en-GB"/>
               <a:t>Second level</a:t>
             </a:r>
           </a:p>
           <a:p>
             <a:pPr lvl="2"/>
             <a:r>
-              <a:rPr lang="en-GB" smtClean="0"/>
+              <a:rPr lang="en-GB"/>
               <a:t>Third level</a:t>
             </a:r>
           </a:p>
           <a:p>
             <a:pPr lvl="3"/>
             <a:r>
-              <a:rPr lang="en-GB" smtClean="0"/>
+              <a:rPr lang="en-GB"/>
               <a:t>Fourth level</a:t>
             </a:r>
           </a:p>
           <a:p>
             <a:pPr lvl="4"/>
             <a:r>
-              <a:rPr lang="en-GB" smtClean="0"/>
+              <a:rPr lang="en-GB"/>
               <a:t>Fifth level</a:t>
             </a:r>
             <a:endParaRPr lang="en-US"/>
@@ -2229,7 +2239,7 @@
           <a:p>
             <a:fld id="{07AF7C9C-3FFC-F543-8CD5-56B058077314}" type="datetimeFigureOut">
               <a:rPr lang="en-US" smtClean="0"/>
-              <a:t>16/07/18</a:t>
+              <a:t>9/27/2018</a:t>
             </a:fld>
             <a:endParaRPr lang="en-US"/>
           </a:p>
@@ -2323,7 +2333,7 @@
           <a:lstStyle/>
           <a:p>
             <a:r>
-              <a:rPr lang="en-GB" smtClean="0"/>
+              <a:rPr lang="en-GB"/>
               <a:t>Click to edit Master title style</a:t>
             </a:r>
             <a:endParaRPr lang="en-US"/>
@@ -2347,7 +2357,7 @@
           <a:p>
             <a:fld id="{07AF7C9C-3FFC-F543-8CD5-56B058077314}" type="datetimeFigureOut">
               <a:rPr lang="en-US" smtClean="0"/>
-              <a:t>16/07/18</a:t>
+              <a:t>9/27/2018</a:t>
             </a:fld>
             <a:endParaRPr lang="en-US"/>
           </a:p>
@@ -2442,7 +2452,7 @@
           <a:p>
             <a:fld id="{07AF7C9C-3FFC-F543-8CD5-56B058077314}" type="datetimeFigureOut">
               <a:rPr lang="en-US" smtClean="0"/>
-              <a:t>16/07/18</a:t>
+              <a:t>9/27/2018</a:t>
             </a:fld>
             <a:endParaRPr lang="en-US"/>
           </a:p>
@@ -2545,7 +2555,7 @@
           </a:lstStyle>
           <a:p>
             <a:r>
-              <a:rPr lang="en-GB" smtClean="0"/>
+              <a:rPr lang="en-GB"/>
               <a:t>Click to edit Master title style</a:t>
             </a:r>
             <a:endParaRPr lang="en-US"/>
@@ -2602,35 +2612,35 @@
           <a:p>
             <a:pPr lvl="0"/>
             <a:r>
-              <a:rPr lang="en-GB" smtClean="0"/>
+              <a:rPr lang="en-GB"/>
               <a:t>Click to edit Master text styles</a:t>
             </a:r>
           </a:p>
           <a:p>
             <a:pPr lvl="1"/>
             <a:r>
-              <a:rPr lang="en-GB" smtClean="0"/>
+              <a:rPr lang="en-GB"/>
               <a:t>Second level</a:t>
             </a:r>
           </a:p>
           <a:p>
             <a:pPr lvl="2"/>
             <a:r>
-              <a:rPr lang="en-GB" smtClean="0"/>
+              <a:rPr lang="en-GB"/>
               <a:t>Third level</a:t>
             </a:r>
           </a:p>
           <a:p>
             <a:pPr lvl="3"/>
             <a:r>
-              <a:rPr lang="en-GB" smtClean="0"/>
+              <a:rPr lang="en-GB"/>
               <a:t>Fourth level</a:t>
             </a:r>
           </a:p>
           <a:p>
             <a:pPr lvl="4"/>
             <a:r>
-              <a:rPr lang="en-GB" smtClean="0"/>
+              <a:rPr lang="en-GB"/>
               <a:t>Fifth level</a:t>
             </a:r>
             <a:endParaRPr lang="en-US"/>
@@ -2696,7 +2706,7 @@
           <a:p>
             <a:pPr lvl="0"/>
             <a:r>
-              <a:rPr lang="en-GB" smtClean="0"/>
+              <a:rPr lang="en-GB"/>
               <a:t>Click to edit Master text styles</a:t>
             </a:r>
           </a:p>
@@ -2719,7 +2729,7 @@
           <a:p>
             <a:fld id="{07AF7C9C-3FFC-F543-8CD5-56B058077314}" type="datetimeFigureOut">
               <a:rPr lang="en-US" smtClean="0"/>
-              <a:t>16/07/18</a:t>
+              <a:t>9/27/2018</a:t>
             </a:fld>
             <a:endParaRPr lang="en-US"/>
           </a:p>
@@ -2822,7 +2832,7 @@
           </a:lstStyle>
           <a:p>
             <a:r>
-              <a:rPr lang="en-GB" smtClean="0"/>
+              <a:rPr lang="en-GB"/>
               <a:t>Click to edit Master title style</a:t>
             </a:r>
             <a:endParaRPr lang="en-US"/>
@@ -2949,7 +2959,7 @@
           <a:p>
             <a:pPr lvl="0"/>
             <a:r>
-              <a:rPr lang="en-GB" smtClean="0"/>
+              <a:rPr lang="en-GB"/>
               <a:t>Click to edit Master text styles</a:t>
             </a:r>
           </a:p>
@@ -2972,7 +2982,7 @@
           <a:p>
             <a:fld id="{07AF7C9C-3FFC-F543-8CD5-56B058077314}" type="datetimeFigureOut">
               <a:rPr lang="en-US" smtClean="0"/>
-              <a:t>16/07/18</a:t>
+              <a:t>9/27/2018</a:t>
             </a:fld>
             <a:endParaRPr lang="en-US"/>
           </a:p>
@@ -3081,7 +3091,7 @@
           <a:lstStyle/>
           <a:p>
             <a:r>
-              <a:rPr lang="en-GB" smtClean="0"/>
+              <a:rPr lang="en-GB"/>
               <a:t>Click to edit Master title style</a:t>
             </a:r>
             <a:endParaRPr lang="en-US"/>
@@ -3115,35 +3125,35 @@
           <a:p>
             <a:pPr lvl="0"/>
             <a:r>
-              <a:rPr lang="en-GB" smtClean="0"/>
+              <a:rPr lang="en-GB"/>
               <a:t>Click to edit Master text styles</a:t>
             </a:r>
           </a:p>
           <a:p>
             <a:pPr lvl="1"/>
             <a:r>
-              <a:rPr lang="en-GB" smtClean="0"/>
+              <a:rPr lang="en-GB"/>
               <a:t>Second level</a:t>
             </a:r>
           </a:p>
           <a:p>
             <a:pPr lvl="2"/>
             <a:r>
-              <a:rPr lang="en-GB" smtClean="0"/>
+              <a:rPr lang="en-GB"/>
               <a:t>Third level</a:t>
             </a:r>
           </a:p>
           <a:p>
             <a:pPr lvl="3"/>
             <a:r>
-              <a:rPr lang="en-GB" smtClean="0"/>
+              <a:rPr lang="en-GB"/>
               <a:t>Fourth level</a:t>
             </a:r>
           </a:p>
           <a:p>
             <a:pPr lvl="4"/>
             <a:r>
-              <a:rPr lang="en-GB" smtClean="0"/>
+              <a:rPr lang="en-GB"/>
               <a:t>Fifth level</a:t>
             </a:r>
             <a:endParaRPr lang="en-US"/>
@@ -3185,7 +3195,7 @@
           <a:p>
             <a:fld id="{07AF7C9C-3FFC-F543-8CD5-56B058077314}" type="datetimeFigureOut">
               <a:rPr lang="en-US" smtClean="0"/>
-              <a:t>16/07/18</a:t>
+              <a:t>9/27/2018</a:t>
             </a:fld>
             <a:endParaRPr lang="en-US"/>
           </a:p>
@@ -3573,6 +3583,47 @@
       </p:grpSpPr>
       <p:sp>
         <p:nvSpPr>
+          <p:cNvPr id="2000" name="footprint"/>
+          <p:cNvSpPr/>
+          <p:nvPr/>
+        </p:nvSpPr>
+        <p:spPr>
+          <a:xfrm>
+            <a:off x="2591381" y="1662018"/>
+            <a:ext cx="80881" cy="77368"/>
+          </a:xfrm>
+          <a:prstGeom prst="ellipse">
+            <a:avLst/>
+          </a:prstGeom>
+          <a:solidFill>
+            <a:srgbClr val="F68222"/>
+          </a:solidFill>
+        </p:spPr>
+        <p:style>
+          <a:lnRef idx="1">
+            <a:schemeClr val="accent1"/>
+          </a:lnRef>
+          <a:fillRef idx="3">
+            <a:schemeClr val="accent1"/>
+          </a:fillRef>
+          <a:effectRef idx="2">
+            <a:schemeClr val="accent1"/>
+          </a:effectRef>
+          <a:fontRef idx="minor">
+            <a:schemeClr val="lt1"/>
+          </a:fontRef>
+        </p:style>
+        <p:txBody>
+          <a:bodyPr rtlCol="0" anchor="ctr"/>
+          <a:lstStyle/>
+          <a:p>
+            <a:pPr algn="ctr"/>
+            <a:endParaRPr lang="en-US"/>
+          </a:p>
+        </p:txBody>
+      </p:sp>
+      <p:sp>
+        <p:nvSpPr>
           <p:cNvPr id="2" name="map"/>
           <p:cNvSpPr/>
           <p:nvPr/>
@@ -3786,7 +3837,7 @@
           <a:lstStyle/>
           <a:p>
             <a:r>
-              <a:rPr lang="en-US" sz="2000" dirty="0" smtClean="0">
+              <a:rPr lang="en-US" sz="2000" dirty="0">
                 <a:solidFill>
                   <a:schemeClr val="bg1"/>
                 </a:solidFill>
@@ -3797,16 +3848,16 @@
               <a:t>Enter Trail</a:t>
             </a:r>
             <a:r>
-              <a:rPr lang="mr-IN" sz="2000" dirty="0" smtClean="0">
+              <a:rPr lang="mr-IN" sz="2000" dirty="0">
                 <a:solidFill>
                   <a:schemeClr val="bg1"/>
                 </a:solidFill>
                 <a:latin typeface="Open Sans" panose="020B0606030504020204" pitchFamily="34" charset="0"/>
                 <a:ea typeface="Open Sans" panose="020B0606030504020204" pitchFamily="34" charset="0"/>
               </a:rPr>
-              <a:t>…</a:t>
-            </a:r>
-            <a:endParaRPr lang="en-US" sz="2000" dirty="0" smtClean="0">
+              <a:t/>
+            </a:r>
+            <a:endParaRPr lang="en-US" sz="2000" dirty="0">
               <a:solidFill>
                 <a:schemeClr val="bg1"/>
               </a:solidFill>
@@ -3825,7 +3876,7 @@
             </a:endParaRPr>
           </a:p>
           <a:p>
-            <a:endParaRPr lang="en-US" sz="2000" dirty="0" smtClean="0">
+            <a:endParaRPr lang="en-US" sz="2000" dirty="0">
               <a:solidFill>
                 <a:schemeClr val="bg1"/>
               </a:solidFill>
@@ -3859,7 +3910,7 @@
           <a:lstStyle/>
           <a:p>
             <a:r>
-              <a:rPr lang="en-US" b="1" dirty="0" smtClean="0">
+              <a:rPr lang="en-US" b="1" dirty="0">
                 <a:solidFill>
                   <a:srgbClr val="00B0F0"/>
                 </a:solidFill>
@@ -3869,14 +3920,6 @@
               </a:rPr>
               <a:t>TIMER</a:t>
             </a:r>
-            <a:endParaRPr lang="en-US" b="1" dirty="0">
-              <a:solidFill>
-                <a:srgbClr val="00B0F0"/>
-              </a:solidFill>
-              <a:latin typeface="Open Sans" panose="020B0606030504020204" pitchFamily="34" charset="0"/>
-              <a:ea typeface="Open Sans" panose="020B0606030504020204" pitchFamily="34" charset="0"/>
-              <a:cs typeface="Open Sans" panose="020B0606030504020204" pitchFamily="34" charset="0"/>
-            </a:endParaRPr>
           </a:p>
         </p:txBody>
       </p:sp>
@@ -3903,7 +3946,7 @@
           <a:lstStyle/>
           <a:p>
             <a:r>
-              <a:rPr lang="en-US" b="1" dirty="0" smtClean="0">
+              <a:rPr lang="en-US" b="1" dirty="0">
                 <a:solidFill>
                   <a:srgbClr val="00B0F0"/>
                 </a:solidFill>
@@ -3913,14 +3956,6 @@
               </a:rPr>
               <a:t>EVENTS</a:t>
             </a:r>
-            <a:endParaRPr lang="en-US" b="1" dirty="0">
-              <a:solidFill>
-                <a:srgbClr val="00B0F0"/>
-              </a:solidFill>
-              <a:latin typeface="Open Sans" panose="020B0606030504020204" pitchFamily="34" charset="0"/>
-              <a:ea typeface="Open Sans" panose="020B0606030504020204" pitchFamily="34" charset="0"/>
-              <a:cs typeface="Open Sans" panose="020B0606030504020204" pitchFamily="34" charset="0"/>
-            </a:endParaRPr>
           </a:p>
         </p:txBody>
       </p:sp>
@@ -4067,11 +4102,7 @@
         </p:nvPicPr>
         <p:blipFill>
           <a:blip r:embed="rId3">
-            <a:extLst>
-              <a:ext uri="{28A0092B-C50C-407E-A947-70E740481C1C}">
-                <a14:useLocalDpi xmlns:a14="http://schemas.microsoft.com/office/drawing/2010/main" val="0"/>
-              </a:ext>
-            </a:extLst>
+            <a:extLst/>
           </a:blip>
           <a:stretch>
             <a:fillRect/>
@@ -4097,11 +4128,7 @@
         </p:nvPicPr>
         <p:blipFill>
           <a:blip r:embed="rId4">
-            <a:extLst>
-              <a:ext uri="{28A0092B-C50C-407E-A947-70E740481C1C}">
-                <a14:useLocalDpi xmlns:a14="http://schemas.microsoft.com/office/drawing/2010/main" val="0"/>
-              </a:ext>
-            </a:extLst>
+            <a:extLst/>
           </a:blip>
           <a:stretch>
             <a:fillRect/>
@@ -4139,7 +4166,7 @@
           <a:lstStyle/>
           <a:p>
             <a:r>
-              <a:rPr lang="en-US" sz="2800" b="1" dirty="0" smtClean="0">
+              <a:rPr lang="en-US" sz="2800" b="1" dirty="0">
                 <a:solidFill>
                   <a:schemeClr val="bg1"/>
                 </a:solidFill>
@@ -4152,7 +4179,7 @@
           </a:p>
           <a:p>
             <a:r>
-              <a:rPr lang="en-US" sz="2800" b="1" dirty="0" smtClean="0">
+              <a:rPr lang="en-US" sz="2800" b="1" dirty="0">
                 <a:solidFill>
                   <a:schemeClr val="bg1"/>
                 </a:solidFill>
@@ -4162,14 +4189,6 @@
               </a:rPr>
               <a:t>2018. RACE 2A</a:t>
             </a:r>
-            <a:endParaRPr lang="en-US" sz="2800" b="1" dirty="0">
-              <a:solidFill>
-                <a:schemeClr val="bg1"/>
-              </a:solidFill>
-              <a:latin typeface="Open Sans" panose="020B0606030504020204" pitchFamily="34" charset="0"/>
-              <a:ea typeface="Open Sans" panose="020B0606030504020204" pitchFamily="34" charset="0"/>
-              <a:cs typeface="Open Sans" panose="020B0606030504020204" pitchFamily="34" charset="0"/>
-            </a:endParaRPr>
           </a:p>
         </p:txBody>
       </p:sp>
@@ -4220,11 +4239,7 @@
         </p:nvPicPr>
         <p:blipFill>
           <a:blip r:embed="rId5">
-            <a:extLst>
-              <a:ext uri="{28A0092B-C50C-407E-A947-70E740481C1C}">
-                <a14:useLocalDpi xmlns:a14="http://schemas.microsoft.com/office/drawing/2010/main" val="0"/>
-              </a:ext>
-            </a:extLst>
+            <a:extLst/>
           </a:blip>
           <a:stretch>
             <a:fillRect/>
@@ -4289,7 +4304,7 @@
           <a:p>
             <a:pPr algn="ctr"/>
             <a:r>
-              <a:rPr lang="en-US" sz="1400" b="1" dirty="0" smtClean="0">
+              <a:rPr lang="en-US" sz="1400" b="1" dirty="0">
                 <a:solidFill>
                   <a:sysClr val="windowText" lastClr="000000"/>
                 </a:solidFill>
@@ -4298,13 +4313,6 @@
               </a:rPr>
               <a:t>AAAA</a:t>
             </a:r>
-            <a:endParaRPr lang="en-US" sz="1400" b="1" dirty="0">
-              <a:solidFill>
-                <a:sysClr val="windowText" lastClr="000000"/>
-              </a:solidFill>
-              <a:latin typeface="Courier New"/>
-              <a:cs typeface="Courier New"/>
-            </a:endParaRPr>
           </a:p>
         </p:txBody>
       </p:sp>
@@ -4321,7 +4329,7 @@
   <p:timing>
     <p:tnLst>
       <p:par>
-        <p:cTn xmlns:p14="http://schemas.microsoft.com/office/powerpoint/2010/main" id="1" dur="indefinite" restart="never" nodeType="tmRoot">
+        <p:cTn id="1" dur="indefinite" restart="never" nodeType="tmRoot">
           <p:childTnLst>
             <p:seq concurrent="1" nextAc="seek">
               <p:cTn id="2" dur="indefinite" nodeType="mainSeq">
@@ -5006,7 +5014,7 @@
   <a:extraClrSchemeLst/>
   <a:extLst>
     <a:ext uri="{05A4C25C-085E-4340-85A3-A5531E510DB2}">
-      <thm15:themeFamily xmlns:thm15="http://schemas.microsoft.com/office/thememl/2012/main" xmlns="" name="Office Theme" id="{62F939B6-93AF-4DB8-9C6B-D6C7DFDC589F}" vid="{4A3C46E8-61CC-4603-A589-7422A47A8E4A}"/>
+      <thm15:themeFamily xmlns:thm15="http://schemas.microsoft.com/office/thememl/2012/main" name="Office Theme" id="{62F939B6-93AF-4DB8-9C6B-D6C7DFDC589F}" vid="{4A3C46E8-61CC-4603-A589-7422A47A8E4A}"/>
     </a:ext>
   </a:extLst>
 </a:theme>

</xml_diff>

<commit_message>
New Master Template with Scaled Rectangle
</commit_message>
<xml_diff>
--- a/org.mwc.cmap.combined.feature/root_installs/sample_data/other_formats/master_template.pptx
+++ b/org.mwc.cmap.combined.feature/root_installs/sample_data/other_formats/master_template.pptx
@@ -208,7 +208,7 @@
           <a:p>
             <a:fld id="{5DBDFAF8-9CD3-4716-8CF2-6121A8FDDE9B}" type="datetimeFigureOut">
               <a:rPr lang="en-US" smtClean="0"/>
-              <a:t>9/27/2018</a:t>
+              <a:t>10/9/2018</a:t>
             </a:fld>
             <a:endParaRPr lang="en-US"/>
           </a:p>
@@ -366,7 +366,7 @@
           <a:p>
             <a:fld id="{C901C09C-499D-45C7-B51C-6D106952E995}" type="slidenum">
               <a:rPr lang="en-US" smtClean="0"/>
-              <a:t>‹#›</a:t>
+              <a:t>‹Nº›</a:t>
             </a:fld>
             <a:endParaRPr lang="en-US"/>
           </a:p>
@@ -763,7 +763,7 @@
           <a:p>
             <a:fld id="{07AF7C9C-3FFC-F543-8CD5-56B058077314}" type="datetimeFigureOut">
               <a:rPr lang="en-US" smtClean="0"/>
-              <a:t>9/27/2018</a:t>
+              <a:t>10/9/2018</a:t>
             </a:fld>
             <a:endParaRPr lang="en-US"/>
           </a:p>
@@ -805,7 +805,7 @@
           <a:p>
             <a:fld id="{E0E3E4AF-3478-F94E-9240-CA1945652EFF}" type="slidenum">
               <a:rPr lang="en-US" smtClean="0"/>
-              <a:t>‹#›</a:t>
+              <a:t>‹Nº›</a:t>
             </a:fld>
             <a:endParaRPr lang="en-US"/>
           </a:p>
@@ -933,7 +933,7 @@
           <a:p>
             <a:fld id="{07AF7C9C-3FFC-F543-8CD5-56B058077314}" type="datetimeFigureOut">
               <a:rPr lang="en-US" smtClean="0"/>
-              <a:t>9/27/2018</a:t>
+              <a:t>10/9/2018</a:t>
             </a:fld>
             <a:endParaRPr lang="en-US"/>
           </a:p>
@@ -975,7 +975,7 @@
           <a:p>
             <a:fld id="{E0E3E4AF-3478-F94E-9240-CA1945652EFF}" type="slidenum">
               <a:rPr lang="en-US" smtClean="0"/>
-              <a:t>‹#›</a:t>
+              <a:t>‹Nº›</a:t>
             </a:fld>
             <a:endParaRPr lang="en-US"/>
           </a:p>
@@ -1113,7 +1113,7 @@
           <a:p>
             <a:fld id="{07AF7C9C-3FFC-F543-8CD5-56B058077314}" type="datetimeFigureOut">
               <a:rPr lang="en-US" smtClean="0"/>
-              <a:t>9/27/2018</a:t>
+              <a:t>10/9/2018</a:t>
             </a:fld>
             <a:endParaRPr lang="en-US"/>
           </a:p>
@@ -1155,7 +1155,7 @@
           <a:p>
             <a:fld id="{E0E3E4AF-3478-F94E-9240-CA1945652EFF}" type="slidenum">
               <a:rPr lang="en-US" smtClean="0"/>
-              <a:t>‹#›</a:t>
+              <a:t>‹Nº›</a:t>
             </a:fld>
             <a:endParaRPr lang="en-US"/>
           </a:p>
@@ -1283,7 +1283,7 @@
           <a:p>
             <a:fld id="{07AF7C9C-3FFC-F543-8CD5-56B058077314}" type="datetimeFigureOut">
               <a:rPr lang="en-US" smtClean="0"/>
-              <a:t>9/27/2018</a:t>
+              <a:t>10/9/2018</a:t>
             </a:fld>
             <a:endParaRPr lang="en-US"/>
           </a:p>
@@ -1325,7 +1325,7 @@
           <a:p>
             <a:fld id="{E0E3E4AF-3478-F94E-9240-CA1945652EFF}" type="slidenum">
               <a:rPr lang="en-US" smtClean="0"/>
-              <a:t>‹#›</a:t>
+              <a:t>‹Nº›</a:t>
             </a:fld>
             <a:endParaRPr lang="en-US"/>
           </a:p>
@@ -1529,7 +1529,7 @@
           <a:p>
             <a:fld id="{07AF7C9C-3FFC-F543-8CD5-56B058077314}" type="datetimeFigureOut">
               <a:rPr lang="en-US" smtClean="0"/>
-              <a:t>9/27/2018</a:t>
+              <a:t>10/9/2018</a:t>
             </a:fld>
             <a:endParaRPr lang="en-US"/>
           </a:p>
@@ -1571,7 +1571,7 @@
           <a:p>
             <a:fld id="{E0E3E4AF-3478-F94E-9240-CA1945652EFF}" type="slidenum">
               <a:rPr lang="en-US" smtClean="0"/>
-              <a:t>‹#›</a:t>
+              <a:t>‹Nº›</a:t>
             </a:fld>
             <a:endParaRPr lang="en-US"/>
           </a:p>
@@ -1817,7 +1817,7 @@
           <a:p>
             <a:fld id="{07AF7C9C-3FFC-F543-8CD5-56B058077314}" type="datetimeFigureOut">
               <a:rPr lang="en-US" smtClean="0"/>
-              <a:t>9/27/2018</a:t>
+              <a:t>10/9/2018</a:t>
             </a:fld>
             <a:endParaRPr lang="en-US"/>
           </a:p>
@@ -1859,7 +1859,7 @@
           <a:p>
             <a:fld id="{E0E3E4AF-3478-F94E-9240-CA1945652EFF}" type="slidenum">
               <a:rPr lang="en-US" smtClean="0"/>
-              <a:t>‹#›</a:t>
+              <a:t>‹Nº›</a:t>
             </a:fld>
             <a:endParaRPr lang="en-US"/>
           </a:p>
@@ -2239,7 +2239,7 @@
           <a:p>
             <a:fld id="{07AF7C9C-3FFC-F543-8CD5-56B058077314}" type="datetimeFigureOut">
               <a:rPr lang="en-US" smtClean="0"/>
-              <a:t>9/27/2018</a:t>
+              <a:t>10/9/2018</a:t>
             </a:fld>
             <a:endParaRPr lang="en-US"/>
           </a:p>
@@ -2281,7 +2281,7 @@
           <a:p>
             <a:fld id="{E0E3E4AF-3478-F94E-9240-CA1945652EFF}" type="slidenum">
               <a:rPr lang="en-US" smtClean="0"/>
-              <a:t>‹#›</a:t>
+              <a:t>‹Nº›</a:t>
             </a:fld>
             <a:endParaRPr lang="en-US"/>
           </a:p>
@@ -2357,7 +2357,7 @@
           <a:p>
             <a:fld id="{07AF7C9C-3FFC-F543-8CD5-56B058077314}" type="datetimeFigureOut">
               <a:rPr lang="en-US" smtClean="0"/>
-              <a:t>9/27/2018</a:t>
+              <a:t>10/9/2018</a:t>
             </a:fld>
             <a:endParaRPr lang="en-US"/>
           </a:p>
@@ -2399,7 +2399,7 @@
           <a:p>
             <a:fld id="{E0E3E4AF-3478-F94E-9240-CA1945652EFF}" type="slidenum">
               <a:rPr lang="en-US" smtClean="0"/>
-              <a:t>‹#›</a:t>
+              <a:t>‹Nº›</a:t>
             </a:fld>
             <a:endParaRPr lang="en-US"/>
           </a:p>
@@ -2452,7 +2452,7 @@
           <a:p>
             <a:fld id="{07AF7C9C-3FFC-F543-8CD5-56B058077314}" type="datetimeFigureOut">
               <a:rPr lang="en-US" smtClean="0"/>
-              <a:t>9/27/2018</a:t>
+              <a:t>10/9/2018</a:t>
             </a:fld>
             <a:endParaRPr lang="en-US"/>
           </a:p>
@@ -2494,7 +2494,7 @@
           <a:p>
             <a:fld id="{E0E3E4AF-3478-F94E-9240-CA1945652EFF}" type="slidenum">
               <a:rPr lang="en-US" smtClean="0"/>
-              <a:t>‹#›</a:t>
+              <a:t>‹Nº›</a:t>
             </a:fld>
             <a:endParaRPr lang="en-US"/>
           </a:p>
@@ -2729,7 +2729,7 @@
           <a:p>
             <a:fld id="{07AF7C9C-3FFC-F543-8CD5-56B058077314}" type="datetimeFigureOut">
               <a:rPr lang="en-US" smtClean="0"/>
-              <a:t>9/27/2018</a:t>
+              <a:t>10/9/2018</a:t>
             </a:fld>
             <a:endParaRPr lang="en-US"/>
           </a:p>
@@ -2771,7 +2771,7 @@
           <a:p>
             <a:fld id="{E0E3E4AF-3478-F94E-9240-CA1945652EFF}" type="slidenum">
               <a:rPr lang="en-US" smtClean="0"/>
-              <a:t>‹#›</a:t>
+              <a:t>‹Nº›</a:t>
             </a:fld>
             <a:endParaRPr lang="en-US"/>
           </a:p>
@@ -2982,7 +2982,7 @@
           <a:p>
             <a:fld id="{07AF7C9C-3FFC-F543-8CD5-56B058077314}" type="datetimeFigureOut">
               <a:rPr lang="en-US" smtClean="0"/>
-              <a:t>9/27/2018</a:t>
+              <a:t>10/9/2018</a:t>
             </a:fld>
             <a:endParaRPr lang="en-US"/>
           </a:p>
@@ -3024,7 +3024,7 @@
           <a:p>
             <a:fld id="{E0E3E4AF-3478-F94E-9240-CA1945652EFF}" type="slidenum">
               <a:rPr lang="en-US" smtClean="0"/>
-              <a:t>‹#›</a:t>
+              <a:t>‹Nº›</a:t>
             </a:fld>
             <a:endParaRPr lang="en-US"/>
           </a:p>
@@ -3195,7 +3195,7 @@
           <a:p>
             <a:fld id="{07AF7C9C-3FFC-F543-8CD5-56B058077314}" type="datetimeFigureOut">
               <a:rPr lang="en-US" smtClean="0"/>
-              <a:t>9/27/2018</a:t>
+              <a:t>10/9/2018</a:t>
             </a:fld>
             <a:endParaRPr lang="en-US"/>
           </a:p>
@@ -3273,7 +3273,7 @@
           <a:p>
             <a:fld id="{E0E3E4AF-3478-F94E-9240-CA1945652EFF}" type="slidenum">
               <a:rPr lang="en-US" smtClean="0"/>
-              <a:t>‹#›</a:t>
+              <a:t>‹Nº›</a:t>
             </a:fld>
             <a:endParaRPr lang="en-US"/>
           </a:p>
@@ -3847,16 +3847,6 @@
               </a:rPr>
               <a:t>Enter Trail</a:t>
             </a:r>
-            <a:r>
-              <a:rPr lang="mr-IN" sz="2000" dirty="0">
-                <a:solidFill>
-                  <a:schemeClr val="bg1"/>
-                </a:solidFill>
-                <a:latin typeface="Open Sans" panose="020B0606030504020204" pitchFamily="34" charset="0"/>
-                <a:ea typeface="Open Sans" panose="020B0606030504020204" pitchFamily="34" charset="0"/>
-              </a:rPr>
-              <a:t/>
-            </a:r>
             <a:endParaRPr lang="en-US" sz="2000" dirty="0">
               <a:solidFill>
                 <a:schemeClr val="bg1"/>
@@ -4313,6 +4303,92 @@
               </a:rPr>
               <a:t>AAAA</a:t>
             </a:r>
+          </a:p>
+        </p:txBody>
+      </p:sp>
+      <p:sp>
+        <p:nvSpPr>
+          <p:cNvPr id="6" name="ScaleBar">
+            <a:extLst>
+              <a:ext uri="{FF2B5EF4-FFF2-40B4-BE49-F238E27FC236}">
+                <a16:creationId xmlns:a16="http://schemas.microsoft.com/office/drawing/2014/main" id="{BE0A2202-FFB4-4A60-9052-9A3901AFC4B2}"/>
+              </a:ext>
+            </a:extLst>
+          </p:cNvPr>
+          <p:cNvSpPr/>
+          <p:nvPr/>
+        </p:nvSpPr>
+        <p:spPr>
+          <a:xfrm>
+            <a:off x="6857000" y="4741507"/>
+            <a:ext cx="2231413" cy="45719"/>
+          </a:xfrm>
+          <a:prstGeom prst="rect">
+            <a:avLst/>
+          </a:prstGeom>
+          <a:solidFill>
+            <a:schemeClr val="dk1"/>
+          </a:solidFill>
+          <a:ln>
+            <a:noFill/>
+          </a:ln>
+        </p:spPr>
+        <p:style>
+          <a:lnRef idx="0">
+            <a:scrgbClr r="0" g="0" b="0"/>
+          </a:lnRef>
+          <a:fillRef idx="0">
+            <a:scrgbClr r="0" g="0" b="0"/>
+          </a:fillRef>
+          <a:effectRef idx="0">
+            <a:scrgbClr r="0" g="0" b="0"/>
+          </a:effectRef>
+          <a:fontRef idx="minor">
+            <a:schemeClr val="lt1"/>
+          </a:fontRef>
+        </p:style>
+        <p:txBody>
+          <a:bodyPr rtlCol="0" anchor="ctr"/>
+          <a:lstStyle/>
+          <a:p>
+            <a:pPr algn="ctr"/>
+            <a:endParaRPr lang="es-AR" dirty="0"/>
+          </a:p>
+        </p:txBody>
+      </p:sp>
+      <p:sp>
+        <p:nvSpPr>
+          <p:cNvPr id="7" name="ScaleValue">
+            <a:extLst>
+              <a:ext uri="{FF2B5EF4-FFF2-40B4-BE49-F238E27FC236}">
+                <a16:creationId xmlns:a16="http://schemas.microsoft.com/office/drawing/2014/main" id="{281A5C4D-5878-421A-96B6-3E7E1B6B0BE4}"/>
+              </a:ext>
+            </a:extLst>
+          </p:cNvPr>
+          <p:cNvSpPr txBox="1"/>
+          <p:nvPr/>
+        </p:nvSpPr>
+        <p:spPr>
+          <a:xfrm>
+            <a:off x="8445288" y="4377587"/>
+            <a:ext cx="643125" cy="369332"/>
+          </a:xfrm>
+          <a:prstGeom prst="rect">
+            <a:avLst/>
+          </a:prstGeom>
+          <a:noFill/>
+        </p:spPr>
+        <p:txBody>
+          <a:bodyPr wrap="none" rtlCol="0">
+            <a:spAutoFit/>
+          </a:bodyPr>
+          <a:lstStyle/>
+          <a:p>
+            <a:r>
+              <a:rPr lang="es-ES_tradnl" dirty="0"/>
+              <a:t>1 km</a:t>
+            </a:r>
+            <a:endParaRPr lang="es-AR" dirty="0"/>
           </a:p>
         </p:txBody>
       </p:sp>

</xml_diff>

<commit_message>
It still generates a corrupted ZIP
</commit_message>
<xml_diff>
--- a/org.mwc.cmap.combined.feature/root_installs/sample_data/other_formats/master_template.pptx
+++ b/org.mwc.cmap.combined.feature/root_installs/sample_data/other_formats/master_template.pptx
@@ -208,7 +208,7 @@
           <a:p>
             <a:fld id="{5DBDFAF8-9CD3-4716-8CF2-6121A8FDDE9B}" type="datetimeFigureOut">
               <a:rPr lang="en-US" smtClean="0"/>
-              <a:t>10/9/2018</a:t>
+              <a:t>10/14/2018</a:t>
             </a:fld>
             <a:endParaRPr lang="en-US"/>
           </a:p>
@@ -763,7 +763,7 @@
           <a:p>
             <a:fld id="{07AF7C9C-3FFC-F543-8CD5-56B058077314}" type="datetimeFigureOut">
               <a:rPr lang="en-US" smtClean="0"/>
-              <a:t>10/9/2018</a:t>
+              <a:t>10/14/2018</a:t>
             </a:fld>
             <a:endParaRPr lang="en-US"/>
           </a:p>
@@ -933,7 +933,7 @@
           <a:p>
             <a:fld id="{07AF7C9C-3FFC-F543-8CD5-56B058077314}" type="datetimeFigureOut">
               <a:rPr lang="en-US" smtClean="0"/>
-              <a:t>10/9/2018</a:t>
+              <a:t>10/14/2018</a:t>
             </a:fld>
             <a:endParaRPr lang="en-US"/>
           </a:p>
@@ -1113,7 +1113,7 @@
           <a:p>
             <a:fld id="{07AF7C9C-3FFC-F543-8CD5-56B058077314}" type="datetimeFigureOut">
               <a:rPr lang="en-US" smtClean="0"/>
-              <a:t>10/9/2018</a:t>
+              <a:t>10/14/2018</a:t>
             </a:fld>
             <a:endParaRPr lang="en-US"/>
           </a:p>
@@ -1283,7 +1283,7 @@
           <a:p>
             <a:fld id="{07AF7C9C-3FFC-F543-8CD5-56B058077314}" type="datetimeFigureOut">
               <a:rPr lang="en-US" smtClean="0"/>
-              <a:t>10/9/2018</a:t>
+              <a:t>10/14/2018</a:t>
             </a:fld>
             <a:endParaRPr lang="en-US"/>
           </a:p>
@@ -1529,7 +1529,7 @@
           <a:p>
             <a:fld id="{07AF7C9C-3FFC-F543-8CD5-56B058077314}" type="datetimeFigureOut">
               <a:rPr lang="en-US" smtClean="0"/>
-              <a:t>10/9/2018</a:t>
+              <a:t>10/14/2018</a:t>
             </a:fld>
             <a:endParaRPr lang="en-US"/>
           </a:p>
@@ -1817,7 +1817,7 @@
           <a:p>
             <a:fld id="{07AF7C9C-3FFC-F543-8CD5-56B058077314}" type="datetimeFigureOut">
               <a:rPr lang="en-US" smtClean="0"/>
-              <a:t>10/9/2018</a:t>
+              <a:t>10/14/2018</a:t>
             </a:fld>
             <a:endParaRPr lang="en-US"/>
           </a:p>
@@ -2239,7 +2239,7 @@
           <a:p>
             <a:fld id="{07AF7C9C-3FFC-F543-8CD5-56B058077314}" type="datetimeFigureOut">
               <a:rPr lang="en-US" smtClean="0"/>
-              <a:t>10/9/2018</a:t>
+              <a:t>10/14/2018</a:t>
             </a:fld>
             <a:endParaRPr lang="en-US"/>
           </a:p>
@@ -2357,7 +2357,7 @@
           <a:p>
             <a:fld id="{07AF7C9C-3FFC-F543-8CD5-56B058077314}" type="datetimeFigureOut">
               <a:rPr lang="en-US" smtClean="0"/>
-              <a:t>10/9/2018</a:t>
+              <a:t>10/14/2018</a:t>
             </a:fld>
             <a:endParaRPr lang="en-US"/>
           </a:p>
@@ -2452,7 +2452,7 @@
           <a:p>
             <a:fld id="{07AF7C9C-3FFC-F543-8CD5-56B058077314}" type="datetimeFigureOut">
               <a:rPr lang="en-US" smtClean="0"/>
-              <a:t>10/9/2018</a:t>
+              <a:t>10/14/2018</a:t>
             </a:fld>
             <a:endParaRPr lang="en-US"/>
           </a:p>
@@ -2729,7 +2729,7 @@
           <a:p>
             <a:fld id="{07AF7C9C-3FFC-F543-8CD5-56B058077314}" type="datetimeFigureOut">
               <a:rPr lang="en-US" smtClean="0"/>
-              <a:t>10/9/2018</a:t>
+              <a:t>10/14/2018</a:t>
             </a:fld>
             <a:endParaRPr lang="en-US"/>
           </a:p>
@@ -2982,7 +2982,7 @@
           <a:p>
             <a:fld id="{07AF7C9C-3FFC-F543-8CD5-56B058077314}" type="datetimeFigureOut">
               <a:rPr lang="en-US" smtClean="0"/>
-              <a:t>10/9/2018</a:t>
+              <a:t>10/14/2018</a:t>
             </a:fld>
             <a:endParaRPr lang="en-US"/>
           </a:p>
@@ -3195,7 +3195,7 @@
           <a:p>
             <a:fld id="{07AF7C9C-3FFC-F543-8CD5-56B058077314}" type="datetimeFigureOut">
               <a:rPr lang="en-US" smtClean="0"/>
-              <a:t>10/9/2018</a:t>
+              <a:t>10/14/2018</a:t>
             </a:fld>
             <a:endParaRPr lang="en-US"/>
           </a:p>
@@ -4164,7 +4164,7 @@
                 <a:ea typeface="Open Sans" panose="020B0606030504020204" pitchFamily="34" charset="0"/>
                 <a:cs typeface="Open Sans" panose="020B0606030504020204" pitchFamily="34" charset="0"/>
               </a:rPr>
-              <a:t>AMERICAS CUP </a:t>
+              <a:t>EXERCISE TITLE </a:t>
             </a:r>
           </a:p>
           <a:p>
@@ -4177,7 +4177,7 @@
                 <a:ea typeface="Open Sans" panose="020B0606030504020204" pitchFamily="34" charset="0"/>
                 <a:cs typeface="Open Sans" panose="020B0606030504020204" pitchFamily="34" charset="0"/>
               </a:rPr>
-              <a:t>2018. RACE 2A</a:t>
+              <a:t>2018 SERIAL 12D</a:t>
             </a:r>
           </a:p>
         </p:txBody>
@@ -4320,7 +4320,7 @@
         </p:nvSpPr>
         <p:spPr>
           <a:xfrm>
-            <a:off x="6857000" y="4741507"/>
+            <a:off x="2611284" y="4781025"/>
             <a:ext cx="2231413" cy="45719"/>
           </a:xfrm>
           <a:prstGeom prst="rect">
@@ -4370,8 +4370,8 @@
         </p:nvSpPr>
         <p:spPr>
           <a:xfrm>
-            <a:off x="8445288" y="4377587"/>
-            <a:ext cx="643125" cy="369332"/>
+            <a:off x="2490173" y="4374197"/>
+            <a:ext cx="2543125" cy="369332"/>
           </a:xfrm>
           <a:prstGeom prst="rect">
             <a:avLst/>

</xml_diff>

<commit_message>
Delete tracks and small fix.
</commit_message>
<xml_diff>
--- a/org.mwc.cmap.combined.feature/root_installs/sample_data/other_formats/master_template.pptx
+++ b/org.mwc.cmap.combined.feature/root_installs/sample_data/other_formats/master_template.pptx
@@ -3640,109 +3640,6 @@
           <a:ln>
             <a:noFill/>
           </a:ln>
-        </p:spPr>
-        <p:style>
-          <a:lnRef idx="1">
-            <a:schemeClr val="accent1"/>
-          </a:lnRef>
-          <a:fillRef idx="3">
-            <a:schemeClr val="accent1"/>
-          </a:fillRef>
-          <a:effectRef idx="2">
-            <a:schemeClr val="accent1"/>
-          </a:effectRef>
-          <a:fontRef idx="minor">
-            <a:schemeClr val="lt1"/>
-          </a:fontRef>
-        </p:style>
-        <p:txBody>
-          <a:bodyPr rtlCol="0" anchor="ctr"/>
-          <a:lstStyle/>
-          <a:p>
-            <a:pPr algn="ctr"/>
-            <a:endParaRPr lang="en-US"/>
-          </a:p>
-        </p:txBody>
-      </p:sp>
-      <p:sp>
-        <p:nvSpPr>
-          <p:cNvPr id="25" name="track"/>
-          <p:cNvSpPr/>
-          <p:nvPr/>
-        </p:nvSpPr>
-        <p:spPr>
-          <a:xfrm>
-            <a:off x="2885807" y="589140"/>
-            <a:ext cx="5920587" cy="1429560"/>
-          </a:xfrm>
-          <a:custGeom>
-            <a:avLst/>
-            <a:gdLst>
-              <a:gd name="connsiteX0" fmla="*/ 0 w 5646821"/>
-              <a:gd name="connsiteY0" fmla="*/ 1267327 h 1429560"/>
-              <a:gd name="connsiteX1" fmla="*/ 2486526 w 5646821"/>
-              <a:gd name="connsiteY1" fmla="*/ 1363579 h 1429560"/>
-              <a:gd name="connsiteX2" fmla="*/ 3737810 w 5646821"/>
-              <a:gd name="connsiteY2" fmla="*/ 401053 h 1429560"/>
-              <a:gd name="connsiteX3" fmla="*/ 4427621 w 5646821"/>
-              <a:gd name="connsiteY3" fmla="*/ 753979 h 1429560"/>
-              <a:gd name="connsiteX4" fmla="*/ 5646821 w 5646821"/>
-              <a:gd name="connsiteY4" fmla="*/ 0 h 1429560"/>
-            </a:gdLst>
-            <a:ahLst/>
-            <a:cxnLst>
-              <a:cxn ang="0">
-                <a:pos x="connsiteX0" y="connsiteY0"/>
-              </a:cxn>
-              <a:cxn ang="0">
-                <a:pos x="connsiteX1" y="connsiteY1"/>
-              </a:cxn>
-              <a:cxn ang="0">
-                <a:pos x="connsiteX2" y="connsiteY2"/>
-              </a:cxn>
-              <a:cxn ang="0">
-                <a:pos x="connsiteX3" y="connsiteY3"/>
-              </a:cxn>
-              <a:cxn ang="0">
-                <a:pos x="connsiteX4" y="connsiteY4"/>
-              </a:cxn>
-            </a:cxnLst>
-            <a:rect l="l" t="t" r="r" b="b"/>
-            <a:pathLst>
-              <a:path w="5646821" h="1429560">
-                <a:moveTo>
-                  <a:pt x="0" y="1267327"/>
-                </a:moveTo>
-                <a:cubicBezTo>
-                  <a:pt x="931779" y="1387642"/>
-                  <a:pt x="1863558" y="1507958"/>
-                  <a:pt x="2486526" y="1363579"/>
-                </a:cubicBezTo>
-                <a:cubicBezTo>
-                  <a:pt x="3109494" y="1219200"/>
-                  <a:pt x="3414294" y="502653"/>
-                  <a:pt x="3737810" y="401053"/>
-                </a:cubicBezTo>
-                <a:cubicBezTo>
-                  <a:pt x="4061326" y="299453"/>
-                  <a:pt x="4109453" y="820821"/>
-                  <a:pt x="4427621" y="753979"/>
-                </a:cubicBezTo>
-                <a:cubicBezTo>
-                  <a:pt x="4745790" y="687137"/>
-                  <a:pt x="5196305" y="343568"/>
-                  <a:pt x="5646821" y="0"/>
-                </a:cubicBezTo>
-              </a:path>
-            </a:pathLst>
-          </a:custGeom>
-          <a:noFill/>
-          <a:ln w="28575">
-            <a:solidFill>
-              <a:srgbClr val="0070C0"/>
-            </a:solidFill>
-          </a:ln>
-          <a:effectLst/>
         </p:spPr>
         <p:style>
           <a:lnRef idx="1">

</xml_diff>